<commit_message>
Update lecture 1 materials for 2024
</commit_message>
<xml_diff>
--- a/01/DATA515_01_AskingQuestions.pptx
+++ b/01/DATA515_01_AskingQuestions.pptx
@@ -8383,7 +8383,7 @@
             </a:pPr>
             <a:r>
               <a:rPr lang="en"/>
-              <a:t>January 3, 2023</a:t>
+              <a:t>January 4, 2024</a:t>
             </a:r>
             <a:endParaRPr/>
           </a:p>
@@ -12130,49 +12130,21 @@
         </p:nvGrpSpPr>
         <p:grpSpPr>
           <a:xfrm>
-            <a:off x="4445900" y="300375"/>
-            <a:ext cx="4167300" cy="2438175"/>
-            <a:chOff x="4596075" y="525625"/>
-            <a:chExt cx="4167300" cy="2438175"/>
+            <a:off x="4445900" y="400997"/>
+            <a:ext cx="4167300" cy="2337553"/>
+            <a:chOff x="4445900" y="400997"/>
+            <a:chExt cx="4167300" cy="2337553"/>
           </a:xfrm>
         </p:grpSpPr>
-        <p:pic>
-          <p:nvPicPr>
-            <p:cNvPr id="94" name="Google Shape;94;p16"/>
-            <p:cNvPicPr preferRelativeResize="0"/>
-            <p:nvPr/>
-          </p:nvPicPr>
-          <p:blipFill>
-            <a:blip r:embed="rId6">
-              <a:alphaModFix/>
-            </a:blip>
-            <a:stretch>
-              <a:fillRect/>
-            </a:stretch>
-          </p:blipFill>
-          <p:spPr>
-            <a:xfrm>
-              <a:off x="5902700" y="525625"/>
-              <a:ext cx="1554050" cy="1565475"/>
-            </a:xfrm>
-            <a:prstGeom prst="rect">
-              <a:avLst/>
-            </a:prstGeom>
-            <a:noFill/>
-            <a:ln>
-              <a:noFill/>
-            </a:ln>
-          </p:spPr>
-        </p:pic>
         <p:sp>
           <p:nvSpPr>
-            <p:cNvPr id="95" name="Google Shape;95;p16"/>
+            <p:cNvPr id="94" name="Google Shape;94;p16"/>
             <p:cNvSpPr txBox="1"/>
             <p:nvPr/>
           </p:nvSpPr>
           <p:spPr>
             <a:xfrm>
-              <a:off x="4596075" y="2091100"/>
+              <a:off x="4445900" y="1865850"/>
               <a:ext cx="4167300" cy="872700"/>
             </a:xfrm>
             <a:prstGeom prst="rect">
@@ -12212,7 +12184,7 @@
                     <a:schemeClr val="dk2"/>
                   </a:solidFill>
                 </a:rPr>
-                <a:t>2. The class Canvas discussion board</a:t>
+                <a:t>2. The class discussion board</a:t>
               </a:r>
               <a:endParaRPr sz="1800">
                 <a:solidFill>
@@ -12237,6 +12209,34 @@
             </a:p>
           </p:txBody>
         </p:sp>
+        <p:pic>
+          <p:nvPicPr>
+            <p:cNvPr id="95" name="Google Shape;95;p16"/>
+            <p:cNvPicPr preferRelativeResize="0"/>
+            <p:nvPr/>
+          </p:nvPicPr>
+          <p:blipFill>
+            <a:blip r:embed="rId6">
+              <a:alphaModFix/>
+            </a:blip>
+            <a:stretch>
+              <a:fillRect/>
+            </a:stretch>
+          </p:blipFill>
+          <p:spPr>
+            <a:xfrm>
+              <a:off x="5680709" y="400997"/>
+              <a:ext cx="1697675" cy="1498775"/>
+            </a:xfrm>
+            <a:prstGeom prst="rect">
+              <a:avLst/>
+            </a:prstGeom>
+            <a:noFill/>
+            <a:ln>
+              <a:noFill/>
+            </a:ln>
+          </p:spPr>
+        </p:pic>
       </p:grpSp>
     </p:spTree>
   </p:cSld>
@@ -12264,7 +12264,7 @@
                             </p:stCondLst>
                             <p:childTnLst>
                               <p:par>
-                                <p:cTn fill="hold" nodeType="clickEffect" presetClass="entr" presetID="10" presetSubtype="0">
+                                <p:cTn fill="hold" nodeType="clickEffect" presetClass="entr" presetID="1" presetSubtype="0">
                                   <p:stCondLst>
                                     <p:cond delay="0"/>
                                   </p:stCondLst>
@@ -12287,14 +12287,6 @@
                                         <p:strVal val="visible"/>
                                       </p:to>
                                     </p:set>
-                                    <p:animEffect filter="fade" transition="in">
-                                      <p:cBhvr>
-                                        <p:cTn dur="1"/>
-                                        <p:tgtEl>
-                                          <p:spTgt spid="90"/>
-                                        </p:tgtEl>
-                                      </p:cBhvr>
-                                    </p:animEffect>
                                   </p:childTnLst>
                                 </p:cTn>
                               </p:par>
@@ -12317,7 +12309,7 @@
                             </p:stCondLst>
                             <p:childTnLst>
                               <p:par>
-                                <p:cTn fill="hold" nodeType="clickEffect" presetClass="entr" presetID="10" presetSubtype="0">
+                                <p:cTn fill="hold" nodeType="clickEffect" presetClass="entr" presetID="1" presetSubtype="0">
                                   <p:stCondLst>
                                     <p:cond delay="0"/>
                                   </p:stCondLst>
@@ -12340,14 +12332,6 @@
                                         <p:strVal val="visible"/>
                                       </p:to>
                                     </p:set>
-                                    <p:animEffect filter="fade" transition="in">
-                                      <p:cBhvr>
-                                        <p:cTn dur="1"/>
-                                        <p:tgtEl>
-                                          <p:spTgt spid="93"/>
-                                        </p:tgtEl>
-                                      </p:cBhvr>
-                                    </p:animEffect>
                                   </p:childTnLst>
                                 </p:cTn>
                               </p:par>
@@ -12370,7 +12354,7 @@
                             </p:stCondLst>
                             <p:childTnLst>
                               <p:par>
-                                <p:cTn fill="hold" nodeType="clickEffect" presetClass="entr" presetID="10" presetSubtype="0">
+                                <p:cTn fill="hold" nodeType="clickEffect" presetClass="entr" presetID="1" presetSubtype="0">
                                   <p:stCondLst>
                                     <p:cond delay="0"/>
                                   </p:stCondLst>
@@ -12393,14 +12377,6 @@
                                         <p:strVal val="visible"/>
                                       </p:to>
                                     </p:set>
-                                    <p:animEffect filter="fade" transition="in">
-                                      <p:cBhvr>
-                                        <p:cTn dur="1"/>
-                                        <p:tgtEl>
-                                          <p:spTgt spid="87"/>
-                                        </p:tgtEl>
-                                      </p:cBhvr>
-                                    </p:animEffect>
                                   </p:childTnLst>
                                 </p:cTn>
                               </p:par>
@@ -12423,7 +12399,7 @@
                             </p:stCondLst>
                             <p:childTnLst>
                               <p:par>
-                                <p:cTn fill="hold" nodeType="clickEffect" presetClass="entr" presetID="10" presetSubtype="0">
+                                <p:cTn fill="hold" nodeType="clickEffect" presetClass="entr" presetID="1" presetSubtype="0">
                                   <p:stCondLst>
                                     <p:cond delay="0"/>
                                   </p:stCondLst>
@@ -12446,14 +12422,6 @@
                                         <p:strVal val="visible"/>
                                       </p:to>
                                     </p:set>
-                                    <p:animEffect filter="fade" transition="in">
-                                      <p:cBhvr>
-                                        <p:cTn dur="1"/>
-                                        <p:tgtEl>
-                                          <p:spTgt spid="84"/>
-                                        </p:tgtEl>
-                                      </p:cBhvr>
-                                    </p:animEffect>
                                   </p:childTnLst>
                                 </p:cTn>
                               </p:par>

</xml_diff>